<commit_message>
admin acount fixed ui bug
</commit_message>
<xml_diff>
--- a/StreamZ__P2.pptx
+++ b/StreamZ__P2.pptx
@@ -14930,10 +14930,10 @@
           <a:lstStyle/>
           <a:p>
             <a:r>
-              <a:rPr lang="pt-PT" sz="2000" dirty="0"/>
+              <a:rPr lang="pt-PT" sz="2000" u="sng" dirty="0"/>
               <a:t>Nº plvrs. título </a:t>
             </a:r>
-            <a:endParaRPr lang="en-GB" sz="2000" dirty="0"/>
+            <a:endParaRPr lang="en-GB" sz="2000" u="sng" dirty="0"/>
           </a:p>
         </p:txBody>
       </p:sp>

</xml_diff>

<commit_message>
Add some stuff to ppt
</commit_message>
<xml_diff>
--- a/StreamZ__P2.pptx
+++ b/StreamZ__P2.pptx
@@ -372,7 +372,7 @@
           <a:p>
             <a:fld id="{B3BE95CB-A87E-409C-9CB9-073D81AF8FD7}" type="slidenum">
               <a:rPr lang="en-GB" smtClean="0"/>
-              <a:t>‹nº›</a:t>
+              <a:t>‹#›</a:t>
             </a:fld>
             <a:endParaRPr lang="en-GB"/>
           </a:p>
@@ -754,7 +754,7 @@
           <a:p>
             <a:fld id="{75DB3F52-068C-4339-9FA6-06F9AAEB3337}" type="slidenum">
               <a:rPr lang="en-GB" smtClean="0"/>
-              <a:t>‹nº›</a:t>
+              <a:t>‹#›</a:t>
             </a:fld>
             <a:endParaRPr lang="en-GB"/>
           </a:p>
@@ -965,7 +965,7 @@
           <a:p>
             <a:fld id="{75DB3F52-068C-4339-9FA6-06F9AAEB3337}" type="slidenum">
               <a:rPr lang="en-GB" smtClean="0"/>
-              <a:t>‹nº›</a:t>
+              <a:t>‹#›</a:t>
             </a:fld>
             <a:endParaRPr lang="en-GB"/>
           </a:p>
@@ -1226,7 +1226,7 @@
           <a:p>
             <a:fld id="{75DB3F52-068C-4339-9FA6-06F9AAEB3337}" type="slidenum">
               <a:rPr lang="en-GB" smtClean="0"/>
-              <a:t>‹nº›</a:t>
+              <a:t>‹#›</a:t>
             </a:fld>
             <a:endParaRPr lang="en-GB"/>
           </a:p>
@@ -1399,7 +1399,7 @@
           <a:p>
             <a:fld id="{75DB3F52-068C-4339-9FA6-06F9AAEB3337}" type="slidenum">
               <a:rPr lang="en-GB" smtClean="0"/>
-              <a:t>‹nº›</a:t>
+              <a:t>‹#›</a:t>
             </a:fld>
             <a:endParaRPr lang="en-GB"/>
           </a:p>
@@ -1739,7 +1739,7 @@
           <a:p>
             <a:fld id="{75DB3F52-068C-4339-9FA6-06F9AAEB3337}" type="slidenum">
               <a:rPr lang="en-GB" smtClean="0"/>
-              <a:t>‹nº›</a:t>
+              <a:t>‹#›</a:t>
             </a:fld>
             <a:endParaRPr lang="en-GB"/>
           </a:p>
@@ -2017,7 +2017,7 @@
           <a:p>
             <a:fld id="{75DB3F52-068C-4339-9FA6-06F9AAEB3337}" type="slidenum">
               <a:rPr lang="en-GB" smtClean="0"/>
-              <a:t>‹nº›</a:t>
+              <a:t>‹#›</a:t>
             </a:fld>
             <a:endParaRPr lang="en-GB"/>
           </a:p>
@@ -2403,7 +2403,7 @@
           <a:p>
             <a:fld id="{75DB3F52-068C-4339-9FA6-06F9AAEB3337}" type="slidenum">
               <a:rPr lang="en-GB" smtClean="0"/>
-              <a:t>‹nº›</a:t>
+              <a:t>‹#›</a:t>
             </a:fld>
             <a:endParaRPr lang="en-GB"/>
           </a:p>
@@ -2524,7 +2524,7 @@
           <a:p>
             <a:fld id="{75DB3F52-068C-4339-9FA6-06F9AAEB3337}" type="slidenum">
               <a:rPr lang="en-GB" smtClean="0"/>
-              <a:t>‹nº›</a:t>
+              <a:t>‹#›</a:t>
             </a:fld>
             <a:endParaRPr lang="en-GB"/>
           </a:p>
@@ -2708,7 +2708,7 @@
           <a:p>
             <a:fld id="{75DB3F52-068C-4339-9FA6-06F9AAEB3337}" type="slidenum">
               <a:rPr lang="en-GB" smtClean="0"/>
-              <a:t>‹nº›</a:t>
+              <a:t>‹#›</a:t>
             </a:fld>
             <a:endParaRPr lang="en-GB"/>
           </a:p>
@@ -3080,7 +3080,7 @@
           <a:p>
             <a:fld id="{75DB3F52-068C-4339-9FA6-06F9AAEB3337}" type="slidenum">
               <a:rPr lang="en-GB" smtClean="0"/>
-              <a:t>‹nº›</a:t>
+              <a:t>‹#›</a:t>
             </a:fld>
             <a:endParaRPr lang="en-GB"/>
           </a:p>
@@ -3426,7 +3426,7 @@
           <a:p>
             <a:fld id="{75DB3F52-068C-4339-9FA6-06F9AAEB3337}" type="slidenum">
               <a:rPr lang="en-GB" smtClean="0"/>
-              <a:t>‹nº›</a:t>
+              <a:t>‹#›</a:t>
             </a:fld>
             <a:endParaRPr lang="en-GB"/>
           </a:p>
@@ -3756,7 +3756,7 @@
           <a:p>
             <a:fld id="{75DB3F52-068C-4339-9FA6-06F9AAEB3337}" type="slidenum">
               <a:rPr lang="en-GB" smtClean="0"/>
-              <a:t>‹nº›</a:t>
+              <a:t>‹#›</a:t>
             </a:fld>
             <a:endParaRPr lang="en-GB"/>
           </a:p>
@@ -4308,11 +4308,31 @@
           <a:p>
             <a:pPr algn="r"/>
             <a:r>
+              <a:rPr lang="en-US" sz="6600" dirty="0" err="1">
+                <a:latin typeface="Bahnschrift SemiLight" panose="020B0502040204020203" pitchFamily="34" charset="0"/>
+              </a:rPr>
+              <a:t>StreamZ</a:t>
+            </a:r>
+            <a:br>
               <a:rPr lang="en-US" sz="6600" dirty="0">
                 <a:latin typeface="Bahnschrift SemiLight" panose="020B0502040204020203" pitchFamily="34" charset="0"/>
               </a:rPr>
-              <a:t>StreamZ_P2</a:t>
-            </a:r>
+            </a:br>
+            <a:r>
+              <a:rPr lang="en-US" sz="4000" dirty="0" err="1">
+                <a:latin typeface="Bahnschrift SemiLight" panose="020B0502040204020203" pitchFamily="34" charset="0"/>
+              </a:rPr>
+              <a:t>Parte</a:t>
+            </a:r>
+            <a:r>
+              <a:rPr lang="en-US" sz="4000" dirty="0">
+                <a:latin typeface="Bahnschrift SemiLight" panose="020B0502040204020203" pitchFamily="34" charset="0"/>
+              </a:rPr>
+              <a:t> 2</a:t>
+            </a:r>
+            <a:endParaRPr lang="en-US" sz="6600" dirty="0">
+              <a:latin typeface="Bahnschrift SemiLight" panose="020B0502040204020203" pitchFamily="34" charset="0"/>
+            </a:endParaRPr>
           </a:p>
         </p:txBody>
       </p:sp>
@@ -5997,18 +6017,10 @@
           <a:lstStyle/>
           <a:p>
             <a:r>
-              <a:rPr lang="pt-PT" sz="1600" dirty="0">
-                <a:solidFill>
-                  <a:srgbClr val="FF0000"/>
-                </a:solidFill>
-              </a:rPr>
+              <a:rPr lang="pt-PT" sz="1600" dirty="0"/>
               <a:t>(excerto) SearchManager.cpp</a:t>
             </a:r>
-            <a:endParaRPr lang="en-GB" dirty="0">
-              <a:solidFill>
-                <a:srgbClr val="FF0000"/>
-              </a:solidFill>
-            </a:endParaRPr>
+            <a:endParaRPr lang="en-GB" dirty="0"/>
           </a:p>
         </p:txBody>
       </p:sp>
@@ -6076,7 +6088,7 @@
           </a:bodyPr>
           <a:lstStyle/>
           <a:p>
-            <a:pPr marL="285750" indent="-285750" algn="just">
+            <a:pPr marL="285750" indent="-285750">
               <a:buClr>
                 <a:srgbClr val="8C2D19"/>
               </a:buClr>
@@ -6093,7 +6105,7 @@
             </a:r>
             <a:r>
               <a:rPr lang="pt-PT" dirty="0"/>
-              <a:t> admite vários parâmetros, portanto é possível filtrar a informação</a:t>
+              <a:t> admite vários parâmetros, portanto é possível filtrar a informação.</a:t>
             </a:r>
           </a:p>
           <a:p>
@@ -6204,42 +6216,6 @@
           </a:prstGeom>
         </p:spPr>
       </p:pic>
-      <p:pic>
-        <p:nvPicPr>
-          <p:cNvPr id="10" name="Picture 9" descr="Text&#10;&#10;Description automatically generated">
-            <a:extLst>
-              <a:ext uri="{FF2B5EF4-FFF2-40B4-BE49-F238E27FC236}">
-                <a16:creationId xmlns:a16="http://schemas.microsoft.com/office/drawing/2014/main" id="{056DD240-8181-4ABF-B7DC-216833BC4DBF}"/>
-              </a:ext>
-            </a:extLst>
-          </p:cNvPr>
-          <p:cNvPicPr>
-            <a:picLocks noChangeAspect="1"/>
-          </p:cNvPicPr>
-          <p:nvPr/>
-        </p:nvPicPr>
-        <p:blipFill>
-          <a:blip r:embed="rId3">
-            <a:extLst>
-              <a:ext uri="{28A0092B-C50C-407E-A947-70E740481C1C}">
-                <a14:useLocalDpi xmlns:a14="http://schemas.microsoft.com/office/drawing/2010/main" val="0"/>
-              </a:ext>
-            </a:extLst>
-          </a:blip>
-          <a:stretch>
-            <a:fillRect/>
-          </a:stretch>
-        </p:blipFill>
-        <p:spPr>
-          <a:xfrm>
-            <a:off x="582990" y="3302500"/>
-            <a:ext cx="4899227" cy="2625689"/>
-          </a:xfrm>
-          <a:prstGeom prst="rect">
-            <a:avLst/>
-          </a:prstGeom>
-        </p:spPr>
-      </p:pic>
       <p:sp>
         <p:nvSpPr>
           <p:cNvPr id="5" name="CaixaDeTexto 4">
@@ -6255,7 +6231,7 @@
         <p:spPr>
           <a:xfrm>
             <a:off x="6217032" y="4349254"/>
-            <a:ext cx="4278405" cy="1754326"/>
+            <a:ext cx="4278405" cy="923330"/>
           </a:xfrm>
           <a:prstGeom prst="rect">
             <a:avLst/>
@@ -6276,37 +6252,23 @@
               <a:buChar char="•"/>
             </a:pPr>
             <a:r>
-              <a:rPr lang="pt-PT" dirty="0">
-                <a:solidFill>
-                  <a:srgbClr val="FF0000"/>
-                </a:solidFill>
-              </a:rPr>
+              <a:rPr lang="pt-PT" dirty="0"/>
               <a:t>Permite listagens com diferentes </a:t>
             </a:r>
             <a:r>
-              <a:rPr lang="pt-PT" dirty="0" err="1">
-                <a:solidFill>
-                  <a:srgbClr val="FF0000"/>
-                </a:solidFill>
-              </a:rPr>
+              <a:rPr lang="pt-PT" dirty="0" err="1"/>
               <a:t>parametros</a:t>
             </a:r>
             <a:r>
-              <a:rPr lang="pt-PT" dirty="0">
-                <a:solidFill>
-                  <a:srgbClr val="FF0000"/>
-                </a:solidFill>
-              </a:rPr>
+              <a:rPr lang="pt-PT" dirty="0"/>
               <a:t>.</a:t>
             </a:r>
           </a:p>
           <a:p>
-            <a:pPr marL="285750" indent="-285750">
+            <a:pPr>
               <a:buClr>
                 <a:srgbClr val="8C2D19"/>
               </a:buClr>
-              <a:buFont typeface="Arial" panose="020B0604020202020204" pitchFamily="34" charset="0"/>
-              <a:buChar char="•"/>
             </a:pPr>
             <a:endParaRPr lang="pt-PT" dirty="0">
               <a:solidFill>
@@ -6314,62 +6276,6 @@
               </a:solidFill>
             </a:endParaRPr>
           </a:p>
-          <a:p>
-            <a:pPr marL="285750" indent="-285750">
-              <a:buClr>
-                <a:srgbClr val="8C2D19"/>
-              </a:buClr>
-              <a:buFont typeface="Arial" panose="020B0604020202020204" pitchFamily="34" charset="0"/>
-              <a:buChar char="•"/>
-            </a:pPr>
-            <a:r>
-              <a:rPr lang="pt-PT" dirty="0">
-                <a:solidFill>
-                  <a:srgbClr val="FF0000"/>
-                </a:solidFill>
-              </a:rPr>
-              <a:t>Contagens com auxilio do algoritmo </a:t>
-            </a:r>
-            <a:r>
-              <a:rPr lang="pt-PT" dirty="0" err="1">
-                <a:solidFill>
-                  <a:srgbClr val="FF0000"/>
-                </a:solidFill>
-              </a:rPr>
-              <a:t>count</a:t>
-            </a:r>
-            <a:r>
-              <a:rPr lang="pt-PT" dirty="0">
-                <a:solidFill>
-                  <a:srgbClr val="FF0000"/>
-                </a:solidFill>
-              </a:rPr>
-              <a:t> da </a:t>
-            </a:r>
-            <a:r>
-              <a:rPr lang="pt-PT" dirty="0" err="1">
-                <a:solidFill>
-                  <a:srgbClr val="FF0000"/>
-                </a:solidFill>
-              </a:rPr>
-              <a:t>stl</a:t>
-            </a:r>
-            <a:r>
-              <a:rPr lang="pt-PT" dirty="0">
-                <a:solidFill>
-                  <a:srgbClr val="FF0000"/>
-                </a:solidFill>
-              </a:rPr>
-              <a:t>.</a:t>
-            </a:r>
-          </a:p>
-          <a:p>
-            <a:endParaRPr lang="en-GB" dirty="0">
-              <a:solidFill>
-                <a:srgbClr val="FF0000"/>
-              </a:solidFill>
-            </a:endParaRPr>
-          </a:p>
         </p:txBody>
       </p:sp>
       <p:pic>
@@ -6378,6 +6284,36 @@
             <a:extLst>
               <a:ext uri="{FF2B5EF4-FFF2-40B4-BE49-F238E27FC236}">
                 <a16:creationId xmlns:a16="http://schemas.microsoft.com/office/drawing/2014/main" id="{831552EC-9C6F-48A3-8063-F2AA980FC078}"/>
+              </a:ext>
+            </a:extLst>
+          </p:cNvPr>
+          <p:cNvPicPr>
+            <a:picLocks noChangeAspect="1"/>
+          </p:cNvPicPr>
+          <p:nvPr/>
+        </p:nvPicPr>
+        <p:blipFill>
+          <a:blip r:embed="rId3"/>
+          <a:stretch>
+            <a:fillRect/>
+          </a:stretch>
+        </p:blipFill>
+        <p:spPr>
+          <a:xfrm>
+            <a:off x="5077342" y="2003842"/>
+            <a:ext cx="6383729" cy="819806"/>
+          </a:xfrm>
+          <a:prstGeom prst="rect">
+            <a:avLst/>
+          </a:prstGeom>
+        </p:spPr>
+      </p:pic>
+      <p:pic>
+        <p:nvPicPr>
+          <p:cNvPr id="9" name="Picture 8">
+            <a:extLst>
+              <a:ext uri="{FF2B5EF4-FFF2-40B4-BE49-F238E27FC236}">
+                <a16:creationId xmlns:a16="http://schemas.microsoft.com/office/drawing/2014/main" id="{3CF502A1-BF52-4B4C-B129-75313872CB84}"/>
               </a:ext>
             </a:extLst>
           </p:cNvPr>
@@ -6394,8 +6330,8 @@
         </p:blipFill>
         <p:spPr>
           <a:xfrm>
-            <a:off x="5077342" y="2003842"/>
-            <a:ext cx="6383729" cy="819806"/>
+            <a:off x="1097279" y="3162843"/>
+            <a:ext cx="4730080" cy="2659000"/>
           </a:xfrm>
           <a:prstGeom prst="rect">
             <a:avLst/>
@@ -7874,23 +7810,7 @@
                   <a:schemeClr val="tx1"/>
                 </a:solidFill>
               </a:rPr>
-              <a:t>Gostaríamos de </a:t>
-            </a:r>
-            <a:r>
-              <a:rPr lang="pt-PT" dirty="0" err="1">
-                <a:solidFill>
-                  <a:schemeClr val="tx1"/>
-                </a:solidFill>
-              </a:rPr>
-              <a:t>resaltar</a:t>
-            </a:r>
-            <a:r>
-              <a:rPr lang="pt-PT" dirty="0">
-                <a:solidFill>
-                  <a:schemeClr val="tx1"/>
-                </a:solidFill>
-              </a:rPr>
-              <a:t> que esta parte 2 foi até fácil de implementar pois o trabalho realizado anteriormente estava bem estruturado.</a:t>
+              <a:t>Gostaríamos de realçar que a segunda parte to trabalho foi relativamente simples de implementar visto que o trabalho realizado anteriormente estava bastante bem estruturado.</a:t>
             </a:r>
           </a:p>
           <a:p>
@@ -16856,12 +16776,227 @@
           </a:fontRef>
         </p:style>
       </p:cxnSp>
+      <p:sp>
+        <p:nvSpPr>
+          <p:cNvPr id="13" name="CaixaDeTexto 12">
+            <a:extLst>
+              <a:ext uri="{FF2B5EF4-FFF2-40B4-BE49-F238E27FC236}">
+                <a16:creationId xmlns:a16="http://schemas.microsoft.com/office/drawing/2014/main" id="{7582186A-0E72-4556-B6E3-75E577AEAB3C}"/>
+              </a:ext>
+            </a:extLst>
+          </p:cNvPr>
+          <p:cNvSpPr txBox="1"/>
+          <p:nvPr/>
+        </p:nvSpPr>
+        <p:spPr>
+          <a:xfrm>
+            <a:off x="1189358" y="2012309"/>
+            <a:ext cx="5468893" cy="1754326"/>
+          </a:xfrm>
+          <a:prstGeom prst="rect">
+            <a:avLst/>
+          </a:prstGeom>
+          <a:noFill/>
+        </p:spPr>
+        <p:txBody>
+          <a:bodyPr wrap="square" rtlCol="0">
+            <a:spAutoFit/>
+          </a:bodyPr>
+          <a:lstStyle/>
+          <a:p>
+            <a:pPr marL="285750" indent="-285750">
+              <a:buClr>
+                <a:srgbClr val="8C2D19"/>
+              </a:buClr>
+              <a:buFont typeface="Arial" panose="020B0604020202020204" pitchFamily="34" charset="0"/>
+              <a:buChar char="•"/>
+            </a:pPr>
+            <a:r>
+              <a:rPr lang="pt-PT" dirty="0"/>
+              <a:t>Pesquisa da BST é feita através de </a:t>
+            </a:r>
+            <a:r>
+              <a:rPr lang="pt-PT" dirty="0" err="1"/>
+              <a:t>iteradores</a:t>
+            </a:r>
+            <a:r>
+              <a:rPr lang="pt-PT" dirty="0"/>
+              <a:t> em ordem, desta forma os elementos obtidos ficam devidamente organizados.</a:t>
+            </a:r>
+          </a:p>
+          <a:p>
+            <a:pPr marL="285750" indent="-285750">
+              <a:buClr>
+                <a:srgbClr val="8C2D19"/>
+              </a:buClr>
+              <a:buFont typeface="Arial" panose="020B0604020202020204" pitchFamily="34" charset="0"/>
+              <a:buChar char="•"/>
+            </a:pPr>
+            <a:r>
+              <a:rPr lang="en-GB" dirty="0"/>
+              <a:t>A </a:t>
+            </a:r>
+            <a:r>
+              <a:rPr lang="en-GB" dirty="0" err="1"/>
+              <a:t>informação</a:t>
+            </a:r>
+            <a:r>
+              <a:rPr lang="en-GB" dirty="0"/>
+              <a:t> </a:t>
+            </a:r>
+            <a:r>
+              <a:rPr lang="en-GB" dirty="0" err="1"/>
+              <a:t>relevante</a:t>
+            </a:r>
+            <a:r>
+              <a:rPr lang="en-GB" dirty="0"/>
+              <a:t> </a:t>
+            </a:r>
+            <a:r>
+              <a:rPr lang="en-GB" dirty="0" err="1"/>
+              <a:t>aos</a:t>
+            </a:r>
+            <a:r>
+              <a:rPr lang="en-GB" dirty="0"/>
+              <a:t> streamers </a:t>
+            </a:r>
+            <a:r>
+              <a:rPr lang="en-GB" dirty="0" err="1"/>
+              <a:t>foi</a:t>
+            </a:r>
+            <a:r>
+              <a:rPr lang="en-GB" dirty="0"/>
+              <a:t> </a:t>
+            </a:r>
+            <a:r>
+              <a:rPr lang="en-GB" dirty="0" err="1"/>
+              <a:t>movida</a:t>
+            </a:r>
+            <a:r>
+              <a:rPr lang="en-GB" dirty="0"/>
+              <a:t> para um </a:t>
+            </a:r>
+            <a:r>
+              <a:rPr lang="en-GB" dirty="0" err="1"/>
+              <a:t>unordered_set</a:t>
+            </a:r>
+            <a:r>
+              <a:rPr lang="en-GB" dirty="0"/>
+              <a:t>. </a:t>
+            </a:r>
+            <a:r>
+              <a:rPr lang="en-GB" dirty="0" err="1"/>
+              <a:t>Teve</a:t>
+            </a:r>
+            <a:r>
+              <a:rPr lang="en-GB" dirty="0"/>
+              <a:t> de se </a:t>
+            </a:r>
+            <a:r>
+              <a:rPr lang="en-GB" dirty="0" err="1"/>
+              <a:t>modificar</a:t>
+            </a:r>
+            <a:r>
+              <a:rPr lang="en-GB" dirty="0"/>
+              <a:t> a </a:t>
+            </a:r>
+            <a:r>
+              <a:rPr lang="en-GB" dirty="0" err="1"/>
+              <a:t>função</a:t>
+            </a:r>
+            <a:r>
+              <a:rPr lang="en-GB" dirty="0"/>
+              <a:t> </a:t>
+            </a:r>
+            <a:r>
+              <a:rPr lang="en-GB" dirty="0" err="1"/>
+              <a:t>getUser</a:t>
+            </a:r>
+            <a:r>
+              <a:rPr lang="en-GB" dirty="0"/>
+              <a:t>.</a:t>
+            </a:r>
+          </a:p>
+        </p:txBody>
+      </p:sp>
+      <p:sp>
+        <p:nvSpPr>
+          <p:cNvPr id="15" name="CaixaDeTexto 14">
+            <a:extLst>
+              <a:ext uri="{FF2B5EF4-FFF2-40B4-BE49-F238E27FC236}">
+                <a16:creationId xmlns:a16="http://schemas.microsoft.com/office/drawing/2014/main" id="{A81839B1-9541-4C3D-90BF-31A386C176B7}"/>
+              </a:ext>
+            </a:extLst>
+          </p:cNvPr>
+          <p:cNvSpPr txBox="1"/>
+          <p:nvPr/>
+        </p:nvSpPr>
+        <p:spPr>
+          <a:xfrm>
+            <a:off x="10028464" y="2862896"/>
+            <a:ext cx="1127216" cy="338554"/>
+          </a:xfrm>
+          <a:prstGeom prst="rect">
+            <a:avLst/>
+          </a:prstGeom>
+          <a:noFill/>
+        </p:spPr>
+        <p:txBody>
+          <a:bodyPr wrap="square" rtlCol="0">
+            <a:spAutoFit/>
+          </a:bodyPr>
+          <a:lstStyle/>
+          <a:p>
+            <a:r>
+              <a:rPr lang="pt-PT" sz="1600" dirty="0" err="1"/>
+              <a:t>DataBase.h</a:t>
+            </a:r>
+            <a:endParaRPr lang="en-GB" sz="1600" dirty="0"/>
+          </a:p>
+        </p:txBody>
+      </p:sp>
+      <p:sp>
+        <p:nvSpPr>
+          <p:cNvPr id="17" name="CaixaDeTexto 16">
+            <a:extLst>
+              <a:ext uri="{FF2B5EF4-FFF2-40B4-BE49-F238E27FC236}">
+                <a16:creationId xmlns:a16="http://schemas.microsoft.com/office/drawing/2014/main" id="{81CB8B24-77F1-4D2B-AD3D-68F6F9D049FA}"/>
+              </a:ext>
+            </a:extLst>
+          </p:cNvPr>
+          <p:cNvSpPr txBox="1"/>
+          <p:nvPr/>
+        </p:nvSpPr>
+        <p:spPr>
+          <a:xfrm>
+            <a:off x="9323511" y="5807790"/>
+            <a:ext cx="1832169" cy="338554"/>
+          </a:xfrm>
+          <a:prstGeom prst="rect">
+            <a:avLst/>
+          </a:prstGeom>
+          <a:noFill/>
+        </p:spPr>
+        <p:txBody>
+          <a:bodyPr wrap="square" rtlCol="0">
+            <a:spAutoFit/>
+          </a:bodyPr>
+          <a:lstStyle/>
+          <a:p>
+            <a:r>
+              <a:rPr lang="pt-PT" sz="1600" dirty="0"/>
+              <a:t>SearchManager.cpp</a:t>
+            </a:r>
+            <a:endParaRPr lang="en-GB" sz="1600" dirty="0"/>
+          </a:p>
+        </p:txBody>
+      </p:sp>
       <p:pic>
         <p:nvPicPr>
-          <p:cNvPr id="9" name="Imagem 8">
-            <a:extLst>
-              <a:ext uri="{FF2B5EF4-FFF2-40B4-BE49-F238E27FC236}">
-                <a16:creationId xmlns:a16="http://schemas.microsoft.com/office/drawing/2014/main" id="{2074C564-1A08-4866-B2B7-02307995EC4F}"/>
+          <p:cNvPr id="19" name="Imagem 18">
+            <a:extLst>
+              <a:ext uri="{FF2B5EF4-FFF2-40B4-BE49-F238E27FC236}">
+                <a16:creationId xmlns:a16="http://schemas.microsoft.com/office/drawing/2014/main" id="{1631380D-B88A-4215-BE0E-22F695C32C8B}"/>
               </a:ext>
             </a:extLst>
           </p:cNvPr>
@@ -16878,220 +17013,6 @@
         </p:blipFill>
         <p:spPr>
           <a:xfrm>
-            <a:off x="4739083" y="3745709"/>
-            <a:ext cx="6349127" cy="2118890"/>
-          </a:xfrm>
-          <a:prstGeom prst="rect">
-            <a:avLst/>
-          </a:prstGeom>
-        </p:spPr>
-      </p:pic>
-      <p:sp>
-        <p:nvSpPr>
-          <p:cNvPr id="13" name="CaixaDeTexto 12">
-            <a:extLst>
-              <a:ext uri="{FF2B5EF4-FFF2-40B4-BE49-F238E27FC236}">
-                <a16:creationId xmlns:a16="http://schemas.microsoft.com/office/drawing/2014/main" id="{7582186A-0E72-4556-B6E3-75E577AEAB3C}"/>
-              </a:ext>
-            </a:extLst>
-          </p:cNvPr>
-          <p:cNvSpPr txBox="1"/>
-          <p:nvPr/>
-        </p:nvSpPr>
-        <p:spPr>
-          <a:xfrm>
-            <a:off x="1189358" y="2012309"/>
-            <a:ext cx="5468893" cy="1754326"/>
-          </a:xfrm>
-          <a:prstGeom prst="rect">
-            <a:avLst/>
-          </a:prstGeom>
-          <a:noFill/>
-        </p:spPr>
-        <p:txBody>
-          <a:bodyPr wrap="square" rtlCol="0">
-            <a:spAutoFit/>
-          </a:bodyPr>
-          <a:lstStyle/>
-          <a:p>
-            <a:pPr marL="285750" indent="-285750">
-              <a:buClr>
-                <a:srgbClr val="8C2D19"/>
-              </a:buClr>
-              <a:buFont typeface="Arial" panose="020B0604020202020204" pitchFamily="34" charset="0"/>
-              <a:buChar char="•"/>
-            </a:pPr>
-            <a:r>
-              <a:rPr lang="pt-PT" dirty="0"/>
-              <a:t>Pesquisa da BST é feita através de </a:t>
-            </a:r>
-            <a:r>
-              <a:rPr lang="pt-PT" dirty="0" err="1"/>
-              <a:t>iteradores</a:t>
-            </a:r>
-            <a:r>
-              <a:rPr lang="pt-PT" dirty="0"/>
-              <a:t> em ordem, desta forma os elementos obtidos ficam devidamente organizados.</a:t>
-            </a:r>
-          </a:p>
-          <a:p>
-            <a:pPr marL="285750" indent="-285750">
-              <a:buClr>
-                <a:srgbClr val="8C2D19"/>
-              </a:buClr>
-              <a:buFont typeface="Arial" panose="020B0604020202020204" pitchFamily="34" charset="0"/>
-              <a:buChar char="•"/>
-            </a:pPr>
-            <a:r>
-              <a:rPr lang="pt-PT" dirty="0">
-                <a:solidFill>
-                  <a:srgbClr val="FF0000"/>
-                </a:solidFill>
-              </a:rPr>
-              <a:t>Permite obter apontador para um dado elemento sabendo apenas o seu identificador (stream ID ou nickname). Ex: </a:t>
-            </a:r>
-            <a:r>
-              <a:rPr lang="pt-PT" dirty="0" err="1">
-                <a:solidFill>
-                  <a:srgbClr val="FF0000"/>
-                </a:solidFill>
-              </a:rPr>
-              <a:t>SearchManager</a:t>
-            </a:r>
-            <a:r>
-              <a:rPr lang="pt-PT" dirty="0">
-                <a:solidFill>
-                  <a:srgbClr val="FF0000"/>
-                </a:solidFill>
-              </a:rPr>
-              <a:t>::</a:t>
-            </a:r>
-            <a:r>
-              <a:rPr lang="pt-PT" dirty="0" err="1">
-                <a:solidFill>
-                  <a:srgbClr val="FF0000"/>
-                </a:solidFill>
-              </a:rPr>
-              <a:t>getUser</a:t>
-            </a:r>
-            <a:r>
-              <a:rPr lang="pt-PT" dirty="0">
-                <a:solidFill>
-                  <a:srgbClr val="FF0000"/>
-                </a:solidFill>
-              </a:rPr>
-              <a:t>()</a:t>
-            </a:r>
-            <a:endParaRPr lang="en-GB" dirty="0">
-              <a:solidFill>
-                <a:srgbClr val="FF0000"/>
-              </a:solidFill>
-            </a:endParaRPr>
-          </a:p>
-        </p:txBody>
-      </p:sp>
-      <p:sp>
-        <p:nvSpPr>
-          <p:cNvPr id="15" name="CaixaDeTexto 14">
-            <a:extLst>
-              <a:ext uri="{FF2B5EF4-FFF2-40B4-BE49-F238E27FC236}">
-                <a16:creationId xmlns:a16="http://schemas.microsoft.com/office/drawing/2014/main" id="{A81839B1-9541-4C3D-90BF-31A386C176B7}"/>
-              </a:ext>
-            </a:extLst>
-          </p:cNvPr>
-          <p:cNvSpPr txBox="1"/>
-          <p:nvPr/>
-        </p:nvSpPr>
-        <p:spPr>
-          <a:xfrm>
-            <a:off x="10028464" y="2862896"/>
-            <a:ext cx="1127216" cy="338554"/>
-          </a:xfrm>
-          <a:prstGeom prst="rect">
-            <a:avLst/>
-          </a:prstGeom>
-          <a:noFill/>
-        </p:spPr>
-        <p:txBody>
-          <a:bodyPr wrap="square" rtlCol="0">
-            <a:spAutoFit/>
-          </a:bodyPr>
-          <a:lstStyle/>
-          <a:p>
-            <a:r>
-              <a:rPr lang="pt-PT" sz="1600" dirty="0" err="1"/>
-              <a:t>DataBase.h</a:t>
-            </a:r>
-            <a:endParaRPr lang="en-GB" sz="1600" dirty="0"/>
-          </a:p>
-        </p:txBody>
-      </p:sp>
-      <p:sp>
-        <p:nvSpPr>
-          <p:cNvPr id="17" name="CaixaDeTexto 16">
-            <a:extLst>
-              <a:ext uri="{FF2B5EF4-FFF2-40B4-BE49-F238E27FC236}">
-                <a16:creationId xmlns:a16="http://schemas.microsoft.com/office/drawing/2014/main" id="{81CB8B24-77F1-4D2B-AD3D-68F6F9D049FA}"/>
-              </a:ext>
-            </a:extLst>
-          </p:cNvPr>
-          <p:cNvSpPr txBox="1"/>
-          <p:nvPr/>
-        </p:nvSpPr>
-        <p:spPr>
-          <a:xfrm>
-            <a:off x="9323511" y="5807790"/>
-            <a:ext cx="1832169" cy="338554"/>
-          </a:xfrm>
-          <a:prstGeom prst="rect">
-            <a:avLst/>
-          </a:prstGeom>
-          <a:noFill/>
-        </p:spPr>
-        <p:txBody>
-          <a:bodyPr wrap="square" rtlCol="0">
-            <a:spAutoFit/>
-          </a:bodyPr>
-          <a:lstStyle/>
-          <a:p>
-            <a:r>
-              <a:rPr lang="pt-PT" sz="1600" dirty="0">
-                <a:solidFill>
-                  <a:srgbClr val="FF0000"/>
-                </a:solidFill>
-              </a:rPr>
-              <a:t>SearchManager.cpp</a:t>
-            </a:r>
-            <a:endParaRPr lang="en-GB" sz="1600" dirty="0">
-              <a:solidFill>
-                <a:srgbClr val="FF0000"/>
-              </a:solidFill>
-            </a:endParaRPr>
-          </a:p>
-        </p:txBody>
-      </p:sp>
-      <p:pic>
-        <p:nvPicPr>
-          <p:cNvPr id="19" name="Imagem 18">
-            <a:extLst>
-              <a:ext uri="{FF2B5EF4-FFF2-40B4-BE49-F238E27FC236}">
-                <a16:creationId xmlns:a16="http://schemas.microsoft.com/office/drawing/2014/main" id="{1631380D-B88A-4215-BE0E-22F695C32C8B}"/>
-              </a:ext>
-            </a:extLst>
-          </p:cNvPr>
-          <p:cNvPicPr>
-            <a:picLocks noChangeAspect="1"/>
-          </p:cNvPicPr>
-          <p:nvPr/>
-        </p:nvPicPr>
-        <p:blipFill>
-          <a:blip r:embed="rId3"/>
-          <a:stretch>
-            <a:fillRect/>
-          </a:stretch>
-        </p:blipFill>
-        <p:spPr>
-          <a:xfrm>
             <a:off x="1189359" y="3745710"/>
             <a:ext cx="3009530" cy="1976285"/>
           </a:xfrm>
@@ -17216,7 +17137,7 @@
           <p:nvPr/>
         </p:nvPicPr>
         <p:blipFill rotWithShape="1">
-          <a:blip r:embed="rId4">
+          <a:blip r:embed="rId3">
             <a:extLst>
               <a:ext uri="{28A0092B-C50C-407E-A947-70E740481C1C}">
                 <a14:useLocalDpi xmlns:a14="http://schemas.microsoft.com/office/drawing/2010/main" val="0"/>
@@ -17242,6 +17163,36 @@
             <a:extLst>
               <a:ext uri="{FF2B5EF4-FFF2-40B4-BE49-F238E27FC236}">
                 <a16:creationId xmlns:a16="http://schemas.microsoft.com/office/drawing/2014/main" id="{01983A3F-4BB4-4B05-B2F2-8B9FB3D3EE53}"/>
+              </a:ext>
+            </a:extLst>
+          </p:cNvPr>
+          <p:cNvPicPr>
+            <a:picLocks noChangeAspect="1"/>
+          </p:cNvPicPr>
+          <p:nvPr/>
+        </p:nvPicPr>
+        <p:blipFill>
+          <a:blip r:embed="rId4"/>
+          <a:stretch>
+            <a:fillRect/>
+          </a:stretch>
+        </p:blipFill>
+        <p:spPr>
+          <a:xfrm>
+            <a:off x="6717741" y="1925499"/>
+            <a:ext cx="4370470" cy="979481"/>
+          </a:xfrm>
+          <a:prstGeom prst="rect">
+            <a:avLst/>
+          </a:prstGeom>
+        </p:spPr>
+      </p:pic>
+      <p:pic>
+        <p:nvPicPr>
+          <p:cNvPr id="6" name="Picture 5">
+            <a:extLst>
+              <a:ext uri="{FF2B5EF4-FFF2-40B4-BE49-F238E27FC236}">
+                <a16:creationId xmlns:a16="http://schemas.microsoft.com/office/drawing/2014/main" id="{734732CE-8093-4C2C-9310-00531976E575}"/>
               </a:ext>
             </a:extLst>
           </p:cNvPr>
@@ -17258,8 +17209,8 @@
         </p:blipFill>
         <p:spPr>
           <a:xfrm>
-            <a:off x="6717741" y="1925499"/>
-            <a:ext cx="4370470" cy="979481"/>
+            <a:off x="5552891" y="3594945"/>
+            <a:ext cx="5535320" cy="2231140"/>
           </a:xfrm>
           <a:prstGeom prst="rect">
             <a:avLst/>

</xml_diff>